<commit_message>
10am updates to presentation
</commit_message>
<xml_diff>
--- a/Sentiment_Trading.pptx
+++ b/Sentiment_Trading.pptx
@@ -5,21 +5,26 @@
     <p:sldMasterId id="2147483828" r:id="rId4"/>
   </p:sldMasterIdLst>
   <p:notesMasterIdLst>
-    <p:notesMasterId r:id="rId14"/>
+    <p:notesMasterId r:id="rId19"/>
   </p:notesMasterIdLst>
   <p:handoutMasterIdLst>
-    <p:handoutMasterId r:id="rId15"/>
+    <p:handoutMasterId r:id="rId20"/>
   </p:handoutMasterIdLst>
   <p:sldIdLst>
     <p:sldId id="256" r:id="rId5"/>
-    <p:sldId id="259" r:id="rId6"/>
-    <p:sldId id="264" r:id="rId7"/>
-    <p:sldId id="260" r:id="rId8"/>
+    <p:sldId id="260" r:id="rId6"/>
+    <p:sldId id="259" r:id="rId7"/>
+    <p:sldId id="264" r:id="rId8"/>
     <p:sldId id="257" r:id="rId9"/>
     <p:sldId id="263" r:id="rId10"/>
     <p:sldId id="262" r:id="rId11"/>
-    <p:sldId id="258" r:id="rId12"/>
-    <p:sldId id="265" r:id="rId13"/>
+    <p:sldId id="265" r:id="rId12"/>
+    <p:sldId id="272" r:id="rId13"/>
+    <p:sldId id="267" r:id="rId14"/>
+    <p:sldId id="270" r:id="rId15"/>
+    <p:sldId id="269" r:id="rId16"/>
+    <p:sldId id="271" r:id="rId17"/>
+    <p:sldId id="273" r:id="rId18"/>
   </p:sldIdLst>
   <p:sldSz cx="12192000" cy="6858000"/>
   <p:notesSz cx="6858000" cy="9144000"/>
@@ -127,6 +132,14 @@
     </p:ext>
   </p:extLst>
 </p:presentation>
+</file>
+
+<file path=ppt/revisionInfo.xml><?xml version="1.0" encoding="utf-8"?>
+<p1510:revInfo xmlns:a="http://schemas.openxmlformats.org/drawingml/2006/main" xmlns:r="http://schemas.openxmlformats.org/officeDocument/2006/relationships" xmlns:p1510="http://schemas.microsoft.com/office/powerpoint/2015/10/main">
+  <p1510:revLst>
+    <p1510:client id="{5B3D346E-4D8D-4D42-A824-D6B5A44509F7}" v="15" dt="2022-06-11T14:56:04.362"/>
+  </p1510:revLst>
+</p1510:revInfo>
 </file>
 
 <file path=ppt/diagrams/colors1.xml><?xml version="1.0" encoding="utf-8"?>
@@ -7166,6 +7179,342 @@
 </p:notes>
 </file>
 
+<file path=ppt/notesSlides/notesSlide10.xml><?xml version="1.0" encoding="utf-8"?>
+<p:notes xmlns:a="http://schemas.openxmlformats.org/drawingml/2006/main" xmlns:r="http://schemas.openxmlformats.org/officeDocument/2006/relationships" xmlns:p="http://schemas.openxmlformats.org/presentationml/2006/main">
+  <p:cSld>
+    <p:spTree>
+      <p:nvGrpSpPr>
+        <p:cNvPr id="1" name=""/>
+        <p:cNvGrpSpPr/>
+        <p:nvPr/>
+      </p:nvGrpSpPr>
+      <p:grpSpPr>
+        <a:xfrm>
+          <a:off x="0" y="0"/>
+          <a:ext cx="0" cy="0"/>
+          <a:chOff x="0" y="0"/>
+          <a:chExt cx="0" cy="0"/>
+        </a:xfrm>
+      </p:grpSpPr>
+      <p:sp>
+        <p:nvSpPr>
+          <p:cNvPr id="2" name="Slide Image Placeholder 1"/>
+          <p:cNvSpPr>
+            <a:spLocks noGrp="1" noRot="1" noChangeAspect="1"/>
+          </p:cNvSpPr>
+          <p:nvPr>
+            <p:ph type="sldImg"/>
+          </p:nvPr>
+        </p:nvSpPr>
+        <p:spPr/>
+      </p:sp>
+      <p:sp>
+        <p:nvSpPr>
+          <p:cNvPr id="3" name="Notes Placeholder 2"/>
+          <p:cNvSpPr>
+            <a:spLocks noGrp="1"/>
+          </p:cNvSpPr>
+          <p:nvPr>
+            <p:ph type="body" idx="1"/>
+          </p:nvPr>
+        </p:nvSpPr>
+        <p:spPr/>
+        <p:txBody>
+          <a:bodyPr/>
+          <a:lstStyle/>
+          <a:p>
+            <a:endParaRPr lang="en-US" dirty="0"/>
+          </a:p>
+        </p:txBody>
+      </p:sp>
+      <p:sp>
+        <p:nvSpPr>
+          <p:cNvPr id="4" name="Slide Number Placeholder 3"/>
+          <p:cNvSpPr>
+            <a:spLocks noGrp="1"/>
+          </p:cNvSpPr>
+          <p:nvPr>
+            <p:ph type="sldNum" sz="quarter" idx="5"/>
+          </p:nvPr>
+        </p:nvSpPr>
+        <p:spPr/>
+        <p:txBody>
+          <a:bodyPr/>
+          <a:lstStyle/>
+          <a:p>
+            <a:fld id="{CFED664B-377C-4B68-AF4E-EBDA643118DF}" type="slidenum">
+              <a:rPr lang="en-US" smtClean="0"/>
+              <a:t>10</a:t>
+            </a:fld>
+            <a:endParaRPr lang="en-US" dirty="0"/>
+          </a:p>
+        </p:txBody>
+      </p:sp>
+    </p:spTree>
+    <p:extLst>
+      <p:ext uri="{BB962C8B-B14F-4D97-AF65-F5344CB8AC3E}">
+        <p14:creationId xmlns:p14="http://schemas.microsoft.com/office/powerpoint/2010/main" val="2910664282"/>
+      </p:ext>
+    </p:extLst>
+  </p:cSld>
+  <p:clrMapOvr>
+    <a:masterClrMapping/>
+  </p:clrMapOvr>
+</p:notes>
+</file>
+
+<file path=ppt/notesSlides/notesSlide11.xml><?xml version="1.0" encoding="utf-8"?>
+<p:notes xmlns:a="http://schemas.openxmlformats.org/drawingml/2006/main" xmlns:r="http://schemas.openxmlformats.org/officeDocument/2006/relationships" xmlns:p="http://schemas.openxmlformats.org/presentationml/2006/main">
+  <p:cSld>
+    <p:spTree>
+      <p:nvGrpSpPr>
+        <p:cNvPr id="1" name=""/>
+        <p:cNvGrpSpPr/>
+        <p:nvPr/>
+      </p:nvGrpSpPr>
+      <p:grpSpPr>
+        <a:xfrm>
+          <a:off x="0" y="0"/>
+          <a:ext cx="0" cy="0"/>
+          <a:chOff x="0" y="0"/>
+          <a:chExt cx="0" cy="0"/>
+        </a:xfrm>
+      </p:grpSpPr>
+      <p:sp>
+        <p:nvSpPr>
+          <p:cNvPr id="2" name="Slide Image Placeholder 1"/>
+          <p:cNvSpPr>
+            <a:spLocks noGrp="1" noRot="1" noChangeAspect="1"/>
+          </p:cNvSpPr>
+          <p:nvPr>
+            <p:ph type="sldImg"/>
+          </p:nvPr>
+        </p:nvSpPr>
+        <p:spPr/>
+      </p:sp>
+      <p:sp>
+        <p:nvSpPr>
+          <p:cNvPr id="3" name="Notes Placeholder 2"/>
+          <p:cNvSpPr>
+            <a:spLocks noGrp="1"/>
+          </p:cNvSpPr>
+          <p:nvPr>
+            <p:ph type="body" idx="1"/>
+          </p:nvPr>
+        </p:nvSpPr>
+        <p:spPr/>
+        <p:txBody>
+          <a:bodyPr/>
+          <a:lstStyle/>
+          <a:p>
+            <a:endParaRPr lang="en-US" dirty="0"/>
+          </a:p>
+        </p:txBody>
+      </p:sp>
+      <p:sp>
+        <p:nvSpPr>
+          <p:cNvPr id="4" name="Slide Number Placeholder 3"/>
+          <p:cNvSpPr>
+            <a:spLocks noGrp="1"/>
+          </p:cNvSpPr>
+          <p:nvPr>
+            <p:ph type="sldNum" sz="quarter" idx="5"/>
+          </p:nvPr>
+        </p:nvSpPr>
+        <p:spPr/>
+        <p:txBody>
+          <a:bodyPr/>
+          <a:lstStyle/>
+          <a:p>
+            <a:fld id="{CFED664B-377C-4B68-AF4E-EBDA643118DF}" type="slidenum">
+              <a:rPr lang="en-US" smtClean="0"/>
+              <a:t>11</a:t>
+            </a:fld>
+            <a:endParaRPr lang="en-US" dirty="0"/>
+          </a:p>
+        </p:txBody>
+      </p:sp>
+    </p:spTree>
+    <p:extLst>
+      <p:ext uri="{BB962C8B-B14F-4D97-AF65-F5344CB8AC3E}">
+        <p14:creationId xmlns:p14="http://schemas.microsoft.com/office/powerpoint/2010/main" val="7715473"/>
+      </p:ext>
+    </p:extLst>
+  </p:cSld>
+  <p:clrMapOvr>
+    <a:masterClrMapping/>
+  </p:clrMapOvr>
+</p:notes>
+</file>
+
+<file path=ppt/notesSlides/notesSlide12.xml><?xml version="1.0" encoding="utf-8"?>
+<p:notes xmlns:a="http://schemas.openxmlformats.org/drawingml/2006/main" xmlns:r="http://schemas.openxmlformats.org/officeDocument/2006/relationships" xmlns:p="http://schemas.openxmlformats.org/presentationml/2006/main">
+  <p:cSld>
+    <p:spTree>
+      <p:nvGrpSpPr>
+        <p:cNvPr id="1" name=""/>
+        <p:cNvGrpSpPr/>
+        <p:nvPr/>
+      </p:nvGrpSpPr>
+      <p:grpSpPr>
+        <a:xfrm>
+          <a:off x="0" y="0"/>
+          <a:ext cx="0" cy="0"/>
+          <a:chOff x="0" y="0"/>
+          <a:chExt cx="0" cy="0"/>
+        </a:xfrm>
+      </p:grpSpPr>
+      <p:sp>
+        <p:nvSpPr>
+          <p:cNvPr id="2" name="Slide Image Placeholder 1"/>
+          <p:cNvSpPr>
+            <a:spLocks noGrp="1" noRot="1" noChangeAspect="1"/>
+          </p:cNvSpPr>
+          <p:nvPr>
+            <p:ph type="sldImg"/>
+          </p:nvPr>
+        </p:nvSpPr>
+        <p:spPr/>
+      </p:sp>
+      <p:sp>
+        <p:nvSpPr>
+          <p:cNvPr id="3" name="Notes Placeholder 2"/>
+          <p:cNvSpPr>
+            <a:spLocks noGrp="1"/>
+          </p:cNvSpPr>
+          <p:nvPr>
+            <p:ph type="body" idx="1"/>
+          </p:nvPr>
+        </p:nvSpPr>
+        <p:spPr/>
+        <p:txBody>
+          <a:bodyPr/>
+          <a:lstStyle/>
+          <a:p>
+            <a:endParaRPr lang="en-US" dirty="0"/>
+          </a:p>
+        </p:txBody>
+      </p:sp>
+      <p:sp>
+        <p:nvSpPr>
+          <p:cNvPr id="4" name="Slide Number Placeholder 3"/>
+          <p:cNvSpPr>
+            <a:spLocks noGrp="1"/>
+          </p:cNvSpPr>
+          <p:nvPr>
+            <p:ph type="sldNum" sz="quarter" idx="5"/>
+          </p:nvPr>
+        </p:nvSpPr>
+        <p:spPr/>
+        <p:txBody>
+          <a:bodyPr/>
+          <a:lstStyle/>
+          <a:p>
+            <a:fld id="{CFED664B-377C-4B68-AF4E-EBDA643118DF}" type="slidenum">
+              <a:rPr lang="en-US" smtClean="0"/>
+              <a:t>12</a:t>
+            </a:fld>
+            <a:endParaRPr lang="en-US" dirty="0"/>
+          </a:p>
+        </p:txBody>
+      </p:sp>
+    </p:spTree>
+    <p:extLst>
+      <p:ext uri="{BB962C8B-B14F-4D97-AF65-F5344CB8AC3E}">
+        <p14:creationId xmlns:p14="http://schemas.microsoft.com/office/powerpoint/2010/main" val="1977252610"/>
+      </p:ext>
+    </p:extLst>
+  </p:cSld>
+  <p:clrMapOvr>
+    <a:masterClrMapping/>
+  </p:clrMapOvr>
+</p:notes>
+</file>
+
+<file path=ppt/notesSlides/notesSlide13.xml><?xml version="1.0" encoding="utf-8"?>
+<p:notes xmlns:a="http://schemas.openxmlformats.org/drawingml/2006/main" xmlns:r="http://schemas.openxmlformats.org/officeDocument/2006/relationships" xmlns:p="http://schemas.openxmlformats.org/presentationml/2006/main">
+  <p:cSld>
+    <p:spTree>
+      <p:nvGrpSpPr>
+        <p:cNvPr id="1" name=""/>
+        <p:cNvGrpSpPr/>
+        <p:nvPr/>
+      </p:nvGrpSpPr>
+      <p:grpSpPr>
+        <a:xfrm>
+          <a:off x="0" y="0"/>
+          <a:ext cx="0" cy="0"/>
+          <a:chOff x="0" y="0"/>
+          <a:chExt cx="0" cy="0"/>
+        </a:xfrm>
+      </p:grpSpPr>
+      <p:sp>
+        <p:nvSpPr>
+          <p:cNvPr id="2" name="Slide Image Placeholder 1"/>
+          <p:cNvSpPr>
+            <a:spLocks noGrp="1" noRot="1" noChangeAspect="1"/>
+          </p:cNvSpPr>
+          <p:nvPr>
+            <p:ph type="sldImg"/>
+          </p:nvPr>
+        </p:nvSpPr>
+        <p:spPr/>
+      </p:sp>
+      <p:sp>
+        <p:nvSpPr>
+          <p:cNvPr id="3" name="Notes Placeholder 2"/>
+          <p:cNvSpPr>
+            <a:spLocks noGrp="1"/>
+          </p:cNvSpPr>
+          <p:nvPr>
+            <p:ph type="body" idx="1"/>
+          </p:nvPr>
+        </p:nvSpPr>
+        <p:spPr/>
+        <p:txBody>
+          <a:bodyPr/>
+          <a:lstStyle/>
+          <a:p>
+            <a:endParaRPr lang="en-US" dirty="0"/>
+          </a:p>
+        </p:txBody>
+      </p:sp>
+      <p:sp>
+        <p:nvSpPr>
+          <p:cNvPr id="4" name="Slide Number Placeholder 3"/>
+          <p:cNvSpPr>
+            <a:spLocks noGrp="1"/>
+          </p:cNvSpPr>
+          <p:nvPr>
+            <p:ph type="sldNum" sz="quarter" idx="5"/>
+          </p:nvPr>
+        </p:nvSpPr>
+        <p:spPr/>
+        <p:txBody>
+          <a:bodyPr/>
+          <a:lstStyle/>
+          <a:p>
+            <a:fld id="{CFED664B-377C-4B68-AF4E-EBDA643118DF}" type="slidenum">
+              <a:rPr lang="en-US" smtClean="0"/>
+              <a:t>13</a:t>
+            </a:fld>
+            <a:endParaRPr lang="en-US" dirty="0"/>
+          </a:p>
+        </p:txBody>
+      </p:sp>
+    </p:spTree>
+    <p:extLst>
+      <p:ext uri="{BB962C8B-B14F-4D97-AF65-F5344CB8AC3E}">
+        <p14:creationId xmlns:p14="http://schemas.microsoft.com/office/powerpoint/2010/main" val="2035080050"/>
+      </p:ext>
+    </p:extLst>
+  </p:cSld>
+  <p:clrMapOvr>
+    <a:masterClrMapping/>
+  </p:clrMapOvr>
+</p:notes>
+</file>
+
 <file path=ppt/notesSlides/notesSlide2.xml><?xml version="1.0" encoding="utf-8"?>
 <p:notes xmlns:a="http://schemas.openxmlformats.org/drawingml/2006/main" xmlns:r="http://schemas.openxmlformats.org/officeDocument/2006/relationships" xmlns:p="http://schemas.openxmlformats.org/presentationml/2006/main">
   <p:cSld>
@@ -7240,7 +7589,7 @@
     </p:spTree>
     <p:extLst>
       <p:ext uri="{BB962C8B-B14F-4D97-AF65-F5344CB8AC3E}">
-        <p14:creationId xmlns:p14="http://schemas.microsoft.com/office/powerpoint/2010/main" val="693570792"/>
+        <p14:creationId xmlns:p14="http://schemas.microsoft.com/office/powerpoint/2010/main" val="3050018501"/>
       </p:ext>
     </p:extLst>
   </p:cSld>
@@ -7324,7 +7673,7 @@
     </p:spTree>
     <p:extLst>
       <p:ext uri="{BB962C8B-B14F-4D97-AF65-F5344CB8AC3E}">
-        <p14:creationId xmlns:p14="http://schemas.microsoft.com/office/powerpoint/2010/main" val="1117731239"/>
+        <p14:creationId xmlns:p14="http://schemas.microsoft.com/office/powerpoint/2010/main" val="693570792"/>
       </p:ext>
     </p:extLst>
   </p:cSld>
@@ -7408,7 +7757,7 @@
     </p:spTree>
     <p:extLst>
       <p:ext uri="{BB962C8B-B14F-4D97-AF65-F5344CB8AC3E}">
-        <p14:creationId xmlns:p14="http://schemas.microsoft.com/office/powerpoint/2010/main" val="3050018501"/>
+        <p14:creationId xmlns:p14="http://schemas.microsoft.com/office/powerpoint/2010/main" val="1117731239"/>
       </p:ext>
     </p:extLst>
   </p:cSld>
@@ -7744,7 +8093,7 @@
     </p:spTree>
     <p:extLst>
       <p:ext uri="{BB962C8B-B14F-4D97-AF65-F5344CB8AC3E}">
-        <p14:creationId xmlns:p14="http://schemas.microsoft.com/office/powerpoint/2010/main" val="174864805"/>
+        <p14:creationId xmlns:p14="http://schemas.microsoft.com/office/powerpoint/2010/main" val="3988305426"/>
       </p:ext>
     </p:extLst>
   </p:cSld>
@@ -7828,7 +8177,7 @@
     </p:spTree>
     <p:extLst>
       <p:ext uri="{BB962C8B-B14F-4D97-AF65-F5344CB8AC3E}">
-        <p14:creationId xmlns:p14="http://schemas.microsoft.com/office/powerpoint/2010/main" val="3988305426"/>
+        <p14:creationId xmlns:p14="http://schemas.microsoft.com/office/powerpoint/2010/main" val="2036701102"/>
       </p:ext>
     </p:extLst>
   </p:cSld>
@@ -11340,7 +11689,657 @@
 </p:sld>
 </file>
 
+<file path=ppt/slides/slide10.xml><?xml version="1.0" encoding="utf-8"?>
+<p:sld xmlns:a="http://schemas.openxmlformats.org/drawingml/2006/main" xmlns:r="http://schemas.openxmlformats.org/officeDocument/2006/relationships" xmlns:p="http://schemas.openxmlformats.org/presentationml/2006/main">
+  <p:cSld>
+    <p:spTree>
+      <p:nvGrpSpPr>
+        <p:cNvPr id="1" name=""/>
+        <p:cNvGrpSpPr/>
+        <p:nvPr/>
+      </p:nvGrpSpPr>
+      <p:grpSpPr>
+        <a:xfrm>
+          <a:off x="0" y="0"/>
+          <a:ext cx="0" cy="0"/>
+          <a:chOff x="0" y="0"/>
+          <a:chExt cx="0" cy="0"/>
+        </a:xfrm>
+      </p:grpSpPr>
+      <p:pic>
+        <p:nvPicPr>
+          <p:cNvPr id="6" name="Picture 5" descr="Chart, line chart&#10;&#10;Description automatically generated">
+            <a:extLst>
+              <a:ext uri="{FF2B5EF4-FFF2-40B4-BE49-F238E27FC236}">
+                <a16:creationId xmlns:a16="http://schemas.microsoft.com/office/drawing/2014/main" id="{A4FA570F-64B5-362F-1D8B-536CAB111972}"/>
+              </a:ext>
+            </a:extLst>
+          </p:cNvPr>
+          <p:cNvPicPr>
+            <a:picLocks noChangeAspect="1"/>
+          </p:cNvPicPr>
+          <p:nvPr/>
+        </p:nvPicPr>
+        <p:blipFill>
+          <a:blip r:embed="rId3"/>
+          <a:stretch>
+            <a:fillRect/>
+          </a:stretch>
+        </p:blipFill>
+        <p:spPr>
+          <a:xfrm>
+            <a:off x="381000" y="0"/>
+            <a:ext cx="11430000" cy="6858000"/>
+          </a:xfrm>
+          <a:prstGeom prst="rect">
+            <a:avLst/>
+          </a:prstGeom>
+        </p:spPr>
+      </p:pic>
+    </p:spTree>
+    <p:extLst>
+      <p:ext uri="{BB962C8B-B14F-4D97-AF65-F5344CB8AC3E}">
+        <p14:creationId xmlns:p14="http://schemas.microsoft.com/office/powerpoint/2010/main" val="3120858485"/>
+      </p:ext>
+    </p:extLst>
+  </p:cSld>
+  <p:clrMapOvr>
+    <a:masterClrMapping/>
+  </p:clrMapOvr>
+</p:sld>
+</file>
+
+<file path=ppt/slides/slide11.xml><?xml version="1.0" encoding="utf-8"?>
+<p:sld xmlns:a="http://schemas.openxmlformats.org/drawingml/2006/main" xmlns:r="http://schemas.openxmlformats.org/officeDocument/2006/relationships" xmlns:p="http://schemas.openxmlformats.org/presentationml/2006/main">
+  <p:cSld>
+    <p:spTree>
+      <p:nvGrpSpPr>
+        <p:cNvPr id="1" name=""/>
+        <p:cNvGrpSpPr/>
+        <p:nvPr/>
+      </p:nvGrpSpPr>
+      <p:grpSpPr>
+        <a:xfrm>
+          <a:off x="0" y="0"/>
+          <a:ext cx="0" cy="0"/>
+          <a:chOff x="0" y="0"/>
+          <a:chExt cx="0" cy="0"/>
+        </a:xfrm>
+      </p:grpSpPr>
+      <p:pic>
+        <p:nvPicPr>
+          <p:cNvPr id="3" name="Picture 2" descr="Chart, line chart, histogram&#10;&#10;Description automatically generated">
+            <a:extLst>
+              <a:ext uri="{FF2B5EF4-FFF2-40B4-BE49-F238E27FC236}">
+                <a16:creationId xmlns:a16="http://schemas.microsoft.com/office/drawing/2014/main" id="{A3D0DA23-6E0C-E2BD-1EC5-8C383E34880F}"/>
+              </a:ext>
+            </a:extLst>
+          </p:cNvPr>
+          <p:cNvPicPr>
+            <a:picLocks noChangeAspect="1"/>
+          </p:cNvPicPr>
+          <p:nvPr/>
+        </p:nvPicPr>
+        <p:blipFill>
+          <a:blip r:embed="rId3"/>
+          <a:stretch>
+            <a:fillRect/>
+          </a:stretch>
+        </p:blipFill>
+        <p:spPr>
+          <a:xfrm>
+            <a:off x="381000" y="0"/>
+            <a:ext cx="11430000" cy="6858000"/>
+          </a:xfrm>
+          <a:prstGeom prst="rect">
+            <a:avLst/>
+          </a:prstGeom>
+        </p:spPr>
+      </p:pic>
+    </p:spTree>
+    <p:extLst>
+      <p:ext uri="{BB962C8B-B14F-4D97-AF65-F5344CB8AC3E}">
+        <p14:creationId xmlns:p14="http://schemas.microsoft.com/office/powerpoint/2010/main" val="1581332847"/>
+      </p:ext>
+    </p:extLst>
+  </p:cSld>
+  <p:clrMapOvr>
+    <a:masterClrMapping/>
+  </p:clrMapOvr>
+</p:sld>
+</file>
+
+<file path=ppt/slides/slide12.xml><?xml version="1.0" encoding="utf-8"?>
+<p:sld xmlns:a="http://schemas.openxmlformats.org/drawingml/2006/main" xmlns:r="http://schemas.openxmlformats.org/officeDocument/2006/relationships" xmlns:p="http://schemas.openxmlformats.org/presentationml/2006/main">
+  <p:cSld>
+    <p:spTree>
+      <p:nvGrpSpPr>
+        <p:cNvPr id="1" name=""/>
+        <p:cNvGrpSpPr/>
+        <p:nvPr/>
+      </p:nvGrpSpPr>
+      <p:grpSpPr>
+        <a:xfrm>
+          <a:off x="0" y="0"/>
+          <a:ext cx="0" cy="0"/>
+          <a:chOff x="0" y="0"/>
+          <a:chExt cx="0" cy="0"/>
+        </a:xfrm>
+      </p:grpSpPr>
+      <p:pic>
+        <p:nvPicPr>
+          <p:cNvPr id="3" name="Picture 2" descr="Chart, histogram&#10;&#10;Description automatically generated">
+            <a:extLst>
+              <a:ext uri="{FF2B5EF4-FFF2-40B4-BE49-F238E27FC236}">
+                <a16:creationId xmlns:a16="http://schemas.microsoft.com/office/drawing/2014/main" id="{7A1017CF-231E-DD16-605B-3645E7F8A3A9}"/>
+              </a:ext>
+            </a:extLst>
+          </p:cNvPr>
+          <p:cNvPicPr>
+            <a:picLocks noChangeAspect="1"/>
+          </p:cNvPicPr>
+          <p:nvPr/>
+        </p:nvPicPr>
+        <p:blipFill>
+          <a:blip r:embed="rId3"/>
+          <a:stretch>
+            <a:fillRect/>
+          </a:stretch>
+        </p:blipFill>
+        <p:spPr>
+          <a:xfrm>
+            <a:off x="381000" y="0"/>
+            <a:ext cx="11430000" cy="6858000"/>
+          </a:xfrm>
+          <a:prstGeom prst="rect">
+            <a:avLst/>
+          </a:prstGeom>
+        </p:spPr>
+      </p:pic>
+    </p:spTree>
+    <p:extLst>
+      <p:ext uri="{BB962C8B-B14F-4D97-AF65-F5344CB8AC3E}">
+        <p14:creationId xmlns:p14="http://schemas.microsoft.com/office/powerpoint/2010/main" val="1492350881"/>
+      </p:ext>
+    </p:extLst>
+  </p:cSld>
+  <p:clrMapOvr>
+    <a:masterClrMapping/>
+  </p:clrMapOvr>
+</p:sld>
+</file>
+
+<file path=ppt/slides/slide13.xml><?xml version="1.0" encoding="utf-8"?>
+<p:sld xmlns:a="http://schemas.openxmlformats.org/drawingml/2006/main" xmlns:r="http://schemas.openxmlformats.org/officeDocument/2006/relationships" xmlns:p="http://schemas.openxmlformats.org/presentationml/2006/main">
+  <p:cSld>
+    <p:spTree>
+      <p:nvGrpSpPr>
+        <p:cNvPr id="1" name=""/>
+        <p:cNvGrpSpPr/>
+        <p:nvPr/>
+      </p:nvGrpSpPr>
+      <p:grpSpPr>
+        <a:xfrm>
+          <a:off x="0" y="0"/>
+          <a:ext cx="0" cy="0"/>
+          <a:chOff x="0" y="0"/>
+          <a:chExt cx="0" cy="0"/>
+        </a:xfrm>
+      </p:grpSpPr>
+      <p:pic>
+        <p:nvPicPr>
+          <p:cNvPr id="3" name="Picture 2" descr="Chart, line chart&#10;&#10;Description automatically generated">
+            <a:extLst>
+              <a:ext uri="{FF2B5EF4-FFF2-40B4-BE49-F238E27FC236}">
+                <a16:creationId xmlns:a16="http://schemas.microsoft.com/office/drawing/2014/main" id="{EADC47D3-B044-A68C-A33E-54FCA837EB5F}"/>
+              </a:ext>
+            </a:extLst>
+          </p:cNvPr>
+          <p:cNvPicPr>
+            <a:picLocks noChangeAspect="1"/>
+          </p:cNvPicPr>
+          <p:nvPr/>
+        </p:nvPicPr>
+        <p:blipFill>
+          <a:blip r:embed="rId3"/>
+          <a:stretch>
+            <a:fillRect/>
+          </a:stretch>
+        </p:blipFill>
+        <p:spPr>
+          <a:xfrm>
+            <a:off x="381000" y="0"/>
+            <a:ext cx="11430000" cy="6858000"/>
+          </a:xfrm>
+          <a:prstGeom prst="rect">
+            <a:avLst/>
+          </a:prstGeom>
+        </p:spPr>
+      </p:pic>
+    </p:spTree>
+    <p:extLst>
+      <p:ext uri="{BB962C8B-B14F-4D97-AF65-F5344CB8AC3E}">
+        <p14:creationId xmlns:p14="http://schemas.microsoft.com/office/powerpoint/2010/main" val="4139444695"/>
+      </p:ext>
+    </p:extLst>
+  </p:cSld>
+  <p:clrMapOvr>
+    <a:masterClrMapping/>
+  </p:clrMapOvr>
+</p:sld>
+</file>
+
+<file path=ppt/slides/slide14.xml><?xml version="1.0" encoding="utf-8"?>
+<p:sld xmlns:a="http://schemas.openxmlformats.org/drawingml/2006/main" xmlns:r="http://schemas.openxmlformats.org/officeDocument/2006/relationships" xmlns:p="http://schemas.openxmlformats.org/presentationml/2006/main">
+  <p:cSld>
+    <p:spTree>
+      <p:nvGrpSpPr>
+        <p:cNvPr id="1" name=""/>
+        <p:cNvGrpSpPr/>
+        <p:nvPr/>
+      </p:nvGrpSpPr>
+      <p:grpSpPr>
+        <a:xfrm>
+          <a:off x="0" y="0"/>
+          <a:ext cx="0" cy="0"/>
+          <a:chOff x="0" y="0"/>
+          <a:chExt cx="0" cy="0"/>
+        </a:xfrm>
+      </p:grpSpPr>
+      <p:sp>
+        <p:nvSpPr>
+          <p:cNvPr id="2" name="Title 1">
+            <a:extLst>
+              <a:ext uri="{FF2B5EF4-FFF2-40B4-BE49-F238E27FC236}">
+                <a16:creationId xmlns:a16="http://schemas.microsoft.com/office/drawing/2014/main" id="{4B7EF2A9-B154-08AA-6683-D68FBA29973C}"/>
+              </a:ext>
+            </a:extLst>
+          </p:cNvPr>
+          <p:cNvSpPr>
+            <a:spLocks noGrp="1"/>
+          </p:cNvSpPr>
+          <p:nvPr>
+            <p:ph type="title"/>
+          </p:nvPr>
+        </p:nvSpPr>
+        <p:spPr/>
+        <p:txBody>
+          <a:bodyPr/>
+          <a:lstStyle/>
+          <a:p>
+            <a:endParaRPr lang="en-US"/>
+          </a:p>
+        </p:txBody>
+      </p:sp>
+      <p:sp>
+        <p:nvSpPr>
+          <p:cNvPr id="3" name="Content Placeholder 2">
+            <a:extLst>
+              <a:ext uri="{FF2B5EF4-FFF2-40B4-BE49-F238E27FC236}">
+                <a16:creationId xmlns:a16="http://schemas.microsoft.com/office/drawing/2014/main" id="{412BD3F3-B175-D080-2BE4-E4FAD7533F7A}"/>
+              </a:ext>
+            </a:extLst>
+          </p:cNvPr>
+          <p:cNvSpPr>
+            <a:spLocks noGrp="1"/>
+          </p:cNvSpPr>
+          <p:nvPr>
+            <p:ph idx="1"/>
+          </p:nvPr>
+        </p:nvSpPr>
+        <p:spPr/>
+        <p:txBody>
+          <a:bodyPr/>
+          <a:lstStyle/>
+          <a:p>
+            <a:endParaRPr lang="en-US"/>
+          </a:p>
+        </p:txBody>
+      </p:sp>
+    </p:spTree>
+    <p:extLst>
+      <p:ext uri="{BB962C8B-B14F-4D97-AF65-F5344CB8AC3E}">
+        <p14:creationId xmlns:p14="http://schemas.microsoft.com/office/powerpoint/2010/main" val="498601585"/>
+      </p:ext>
+    </p:extLst>
+  </p:cSld>
+  <p:clrMapOvr>
+    <a:masterClrMapping/>
+  </p:clrMapOvr>
+</p:sld>
+</file>
+
 <file path=ppt/slides/slide2.xml><?xml version="1.0" encoding="utf-8"?>
+<p:sld xmlns:a="http://schemas.openxmlformats.org/drawingml/2006/main" xmlns:r="http://schemas.openxmlformats.org/officeDocument/2006/relationships" xmlns:p="http://schemas.openxmlformats.org/presentationml/2006/main">
+  <p:cSld>
+    <p:bg>
+      <p:bgPr>
+        <a:solidFill>
+          <a:schemeClr val="bg1">
+            <a:lumMod val="95000"/>
+          </a:schemeClr>
+        </a:solidFill>
+        <a:effectLst/>
+      </p:bgPr>
+    </p:bg>
+    <p:spTree>
+      <p:nvGrpSpPr>
+        <p:cNvPr id="1" name=""/>
+        <p:cNvGrpSpPr/>
+        <p:nvPr/>
+      </p:nvGrpSpPr>
+      <p:grpSpPr>
+        <a:xfrm>
+          <a:off x="0" y="0"/>
+          <a:ext cx="0" cy="0"/>
+          <a:chOff x="0" y="0"/>
+          <a:chExt cx="0" cy="0"/>
+        </a:xfrm>
+      </p:grpSpPr>
+      <p:sp>
+        <p:nvSpPr>
+          <p:cNvPr id="2" name="Title 1">
+            <a:extLst>
+              <a:ext uri="{FF2B5EF4-FFF2-40B4-BE49-F238E27FC236}">
+                <a16:creationId xmlns:a16="http://schemas.microsoft.com/office/drawing/2014/main" id="{51F70220-677A-411B-B416-94321A555329}"/>
+              </a:ext>
+            </a:extLst>
+          </p:cNvPr>
+          <p:cNvSpPr>
+            <a:spLocks noGrp="1"/>
+          </p:cNvSpPr>
+          <p:nvPr>
+            <p:ph type="title"/>
+          </p:nvPr>
+        </p:nvSpPr>
+        <p:spPr>
+          <a:xfrm>
+            <a:off x="804672" y="964692"/>
+            <a:ext cx="4476806" cy="1188720"/>
+          </a:xfrm>
+        </p:spPr>
+        <p:txBody>
+          <a:bodyPr vert="horz" lIns="182880" tIns="182880" rIns="182880" bIns="182880" rtlCol="0">
+            <a:normAutofit/>
+          </a:bodyPr>
+          <a:lstStyle/>
+          <a:p>
+            <a:br>
+              <a:rPr lang="en-US" sz="2000" dirty="0"/>
+            </a:br>
+            <a:r>
+              <a:rPr lang="en-US" sz="2000" dirty="0"/>
+              <a:t>Overview</a:t>
+            </a:r>
+            <a:br>
+              <a:rPr lang="en-US" sz="2000" dirty="0"/>
+            </a:br>
+            <a:endParaRPr lang="en-US" sz="2000" dirty="0"/>
+          </a:p>
+        </p:txBody>
+      </p:sp>
+      <p:sp>
+        <p:nvSpPr>
+          <p:cNvPr id="3" name="Content Placeholder 2">
+            <a:extLst>
+              <a:ext uri="{FF2B5EF4-FFF2-40B4-BE49-F238E27FC236}">
+                <a16:creationId xmlns:a16="http://schemas.microsoft.com/office/drawing/2014/main" id="{667D1328-A694-4327-A93A-3D919FD65B27}"/>
+              </a:ext>
+            </a:extLst>
+          </p:cNvPr>
+          <p:cNvSpPr>
+            <a:spLocks noGrp="1"/>
+          </p:cNvSpPr>
+          <p:nvPr>
+            <p:ph idx="1"/>
+          </p:nvPr>
+        </p:nvSpPr>
+        <p:spPr>
+          <a:xfrm>
+            <a:off x="803244" y="2638044"/>
+            <a:ext cx="4492932" cy="3263206"/>
+          </a:xfrm>
+        </p:spPr>
+        <p:txBody>
+          <a:bodyPr>
+            <a:normAutofit/>
+          </a:bodyPr>
+          <a:lstStyle/>
+          <a:p>
+            <a:r>
+              <a:rPr lang="en-US" dirty="0"/>
+              <a:t>Objective:</a:t>
+            </a:r>
+          </a:p>
+          <a:p>
+            <a:pPr lvl="1"/>
+            <a:r>
+              <a:rPr lang="en-US" dirty="0"/>
+              <a:t>Create and compare sentiment-based trading (simple), ML strategy, and HODL approach</a:t>
+            </a:r>
+          </a:p>
+          <a:p>
+            <a:r>
+              <a:rPr lang="en-US" dirty="0">
+                <a:latin typeface="-apple-system"/>
+              </a:rPr>
+              <a:t>Start with $1,000 base investment to see profits/losses</a:t>
+            </a:r>
+          </a:p>
+          <a:p>
+            <a:r>
+              <a:rPr lang="en-US" dirty="0"/>
+              <a:t>Time Frame: 1-2 years</a:t>
+            </a:r>
+          </a:p>
+          <a:p>
+            <a:pPr marL="0" indent="0">
+              <a:buNone/>
+            </a:pPr>
+            <a:endParaRPr lang="en-US" dirty="0">
+              <a:latin typeface="-apple-system"/>
+            </a:endParaRPr>
+          </a:p>
+          <a:p>
+            <a:pPr marL="0" indent="0">
+              <a:buNone/>
+            </a:pPr>
+            <a:endParaRPr lang="en-US" dirty="0">
+              <a:latin typeface="-apple-system"/>
+            </a:endParaRPr>
+          </a:p>
+          <a:p>
+            <a:endParaRPr lang="en-US" dirty="0"/>
+          </a:p>
+        </p:txBody>
+      </p:sp>
+      <p:sp>
+        <p:nvSpPr>
+          <p:cNvPr id="3101" name="Rectangle 3100">
+            <a:extLst>
+              <a:ext uri="{FF2B5EF4-FFF2-40B4-BE49-F238E27FC236}">
+                <a16:creationId xmlns:a16="http://schemas.microsoft.com/office/drawing/2014/main" id="{56533F40-045E-4E3D-9243-864CD4E58669}"/>
+              </a:ext>
+              <a:ext uri="{C183D7F6-B498-43B3-948B-1728B52AA6E4}">
+                <adec:decorative xmlns:adec="http://schemas.microsoft.com/office/drawing/2017/decorative" val="1"/>
+              </a:ext>
+            </a:extLst>
+          </p:cNvPr>
+          <p:cNvSpPr>
+            <a:spLocks noGrp="1" noRot="1" noChangeAspect="1" noMove="1" noResize="1" noEditPoints="1" noAdjustHandles="1" noChangeArrowheads="1" noChangeShapeType="1" noTextEdit="1"/>
+          </p:cNvSpPr>
+          <p:nvPr>
+            <p:extLst>
+              <p:ext uri="{386F3935-93C4-4BCD-93E2-E3B085C9AB24}">
+                <p16:designElem xmlns:p16="http://schemas.microsoft.com/office/powerpoint/2015/main" val="1"/>
+              </p:ext>
+            </p:extLst>
+          </p:nvPr>
+        </p:nvSpPr>
+        <p:spPr>
+          <a:xfrm>
+            <a:off x="5943605" y="964692"/>
+            <a:ext cx="5440680" cy="4936558"/>
+          </a:xfrm>
+          <a:prstGeom prst="rect">
+            <a:avLst/>
+          </a:prstGeom>
+          <a:noFill/>
+          <a:ln w="31750" cap="sq">
+            <a:solidFill>
+              <a:srgbClr val="FFFFFF"/>
+            </a:solidFill>
+            <a:miter lim="800000"/>
+          </a:ln>
+        </p:spPr>
+        <p:style>
+          <a:lnRef idx="2">
+            <a:schemeClr val="accent1">
+              <a:shade val="50000"/>
+            </a:schemeClr>
+          </a:lnRef>
+          <a:fillRef idx="1">
+            <a:schemeClr val="accent1"/>
+          </a:fillRef>
+          <a:effectRef idx="0">
+            <a:schemeClr val="accent1"/>
+          </a:effectRef>
+          <a:fontRef idx="minor">
+            <a:schemeClr val="lt1"/>
+          </a:fontRef>
+        </p:style>
+        <p:txBody>
+          <a:bodyPr rtlCol="0" anchor="ctr"/>
+          <a:lstStyle/>
+          <a:p>
+            <a:pPr algn="ctr"/>
+            <a:endParaRPr lang="en-US" dirty="0"/>
+          </a:p>
+        </p:txBody>
+      </p:sp>
+      <p:sp>
+        <p:nvSpPr>
+          <p:cNvPr id="3103" name="Rectangle 3102">
+            <a:extLst>
+              <a:ext uri="{FF2B5EF4-FFF2-40B4-BE49-F238E27FC236}">
+                <a16:creationId xmlns:a16="http://schemas.microsoft.com/office/drawing/2014/main" id="{30402EC6-D845-41B3-BEBE-CB34D9BFEA60}"/>
+              </a:ext>
+              <a:ext uri="{C183D7F6-B498-43B3-948B-1728B52AA6E4}">
+                <adec:decorative xmlns:adec="http://schemas.microsoft.com/office/drawing/2017/decorative" val="1"/>
+              </a:ext>
+            </a:extLst>
+          </p:cNvPr>
+          <p:cNvSpPr>
+            <a:spLocks noGrp="1" noRot="1" noChangeAspect="1" noMove="1" noResize="1" noEditPoints="1" noAdjustHandles="1" noChangeArrowheads="1" noChangeShapeType="1" noTextEdit="1"/>
+          </p:cNvSpPr>
+          <p:nvPr>
+            <p:extLst>
+              <p:ext uri="{386F3935-93C4-4BCD-93E2-E3B085C9AB24}">
+                <p16:designElem xmlns:p16="http://schemas.microsoft.com/office/powerpoint/2015/main" val="1"/>
+              </p:ext>
+            </p:extLst>
+          </p:nvPr>
+        </p:nvSpPr>
+        <p:spPr>
+          <a:xfrm>
+            <a:off x="6110699" y="1128683"/>
+            <a:ext cx="5106493" cy="4608576"/>
+          </a:xfrm>
+          <a:prstGeom prst="rect">
+            <a:avLst/>
+          </a:prstGeom>
+          <a:solidFill>
+            <a:srgbClr val="FFFFFF"/>
+          </a:solidFill>
+          <a:ln>
+            <a:noFill/>
+          </a:ln>
+        </p:spPr>
+        <p:style>
+          <a:lnRef idx="2">
+            <a:schemeClr val="accent1">
+              <a:shade val="50000"/>
+            </a:schemeClr>
+          </a:lnRef>
+          <a:fillRef idx="1">
+            <a:schemeClr val="accent1"/>
+          </a:fillRef>
+          <a:effectRef idx="0">
+            <a:schemeClr val="accent1"/>
+          </a:effectRef>
+          <a:fontRef idx="minor">
+            <a:schemeClr val="lt1"/>
+          </a:fontRef>
+        </p:style>
+        <p:txBody>
+          <a:bodyPr rtlCol="0" anchor="ctr"/>
+          <a:lstStyle/>
+          <a:p>
+            <a:pPr algn="ctr"/>
+            <a:endParaRPr lang="en-US"/>
+          </a:p>
+        </p:txBody>
+      </p:sp>
+      <p:pic>
+        <p:nvPicPr>
+          <p:cNvPr id="3076" name="Picture 4" descr="The Russian fintech scene in the spotlight - Emerging Europe">
+            <a:extLst>
+              <a:ext uri="{FF2B5EF4-FFF2-40B4-BE49-F238E27FC236}">
+                <a16:creationId xmlns:a16="http://schemas.microsoft.com/office/drawing/2014/main" id="{45C8429F-2FB8-4396-0485-F7862CC7E946}"/>
+              </a:ext>
+            </a:extLst>
+          </p:cNvPr>
+          <p:cNvPicPr>
+            <a:picLocks noChangeAspect="1" noChangeArrowheads="1"/>
+          </p:cNvPicPr>
+          <p:nvPr/>
+        </p:nvPicPr>
+        <p:blipFill>
+          <a:blip r:embed="rId3">
+            <a:extLst>
+              <a:ext uri="{28A0092B-C50C-407E-A947-70E740481C1C}">
+                <a14:useLocalDpi xmlns:a14="http://schemas.microsoft.com/office/drawing/2010/main" val="0"/>
+              </a:ext>
+            </a:extLst>
+          </a:blip>
+          <a:stretch>
+            <a:fillRect/>
+          </a:stretch>
+        </p:blipFill>
+        <p:spPr bwMode="auto">
+          <a:xfrm>
+            <a:off x="6272789" y="2087946"/>
+            <a:ext cx="4782312" cy="2690050"/>
+          </a:xfrm>
+          <a:prstGeom prst="rect">
+            <a:avLst/>
+          </a:prstGeom>
+          <a:noFill/>
+          <a:extLst>
+            <a:ext uri="{909E8E84-426E-40DD-AFC4-6F175D3DCCD1}">
+              <a14:hiddenFill xmlns:a14="http://schemas.microsoft.com/office/drawing/2010/main">
+                <a:solidFill>
+                  <a:srgbClr val="FFFFFF"/>
+                </a:solidFill>
+              </a14:hiddenFill>
+            </a:ext>
+          </a:extLst>
+        </p:spPr>
+      </p:pic>
+    </p:spTree>
+    <p:extLst>
+      <p:ext uri="{BB962C8B-B14F-4D97-AF65-F5344CB8AC3E}">
+        <p14:creationId xmlns:p14="http://schemas.microsoft.com/office/powerpoint/2010/main" val="2673849116"/>
+      </p:ext>
+    </p:extLst>
+  </p:cSld>
+  <p:clrMapOvr>
+    <a:masterClrMapping/>
+  </p:clrMapOvr>
+</p:sld>
+</file>
+
+<file path=ppt/slides/slide3.xml><?xml version="1.0" encoding="utf-8"?>
 <p:sld xmlns:a="http://schemas.openxmlformats.org/drawingml/2006/main" xmlns:r="http://schemas.openxmlformats.org/officeDocument/2006/relationships" xmlns:p="http://schemas.openxmlformats.org/presentationml/2006/main">
   <p:cSld>
     <p:bg>
@@ -11972,7 +12971,7 @@
 </p:sld>
 </file>
 
-<file path=ppt/slides/slide3.xml><?xml version="1.0" encoding="utf-8"?>
+<file path=ppt/slides/slide4.xml><?xml version="1.0" encoding="utf-8"?>
 <p:sld xmlns:a="http://schemas.openxmlformats.org/drawingml/2006/main" xmlns:r="http://schemas.openxmlformats.org/officeDocument/2006/relationships" xmlns:p="http://schemas.openxmlformats.org/presentationml/2006/main">
   <p:cSld>
     <p:bg>
@@ -12237,14 +13236,43 @@
               </a:rPr>
               <a:t>Cardano</a:t>
             </a:r>
-            <a:endParaRPr lang="en-US" sz="1500" dirty="0">
-              <a:solidFill>
-                <a:schemeClr val="tx1">
-                  <a:lumMod val="85000"/>
-                  <a:lumOff val="15000"/>
-                </a:schemeClr>
-              </a:solidFill>
-            </a:endParaRPr>
+            <a:r>
+              <a:rPr lang="en-US" sz="1500" dirty="0">
+                <a:solidFill>
+                  <a:schemeClr val="tx1">
+                    <a:lumMod val="85000"/>
+                    <a:lumOff val="15000"/>
+                  </a:schemeClr>
+                </a:solidFill>
+              </a:rPr>
+              <a:t> (ADA)</a:t>
+            </a:r>
+          </a:p>
+          <a:p>
+            <a:pPr marL="742950" lvl="1" indent="-228600" defTabSz="914400">
+              <a:lnSpc>
+                <a:spcPct val="90000"/>
+              </a:lnSpc>
+              <a:spcBef>
+                <a:spcPts val="1000"/>
+              </a:spcBef>
+              <a:buClr>
+                <a:schemeClr val="accent2"/>
+              </a:buClr>
+              <a:buFont typeface="Arial" panose="020B0604020202020204" pitchFamily="34" charset="0"/>
+              <a:buChar char="•"/>
+            </a:pPr>
+            <a:r>
+              <a:rPr lang="en-US" sz="1500" dirty="0">
+                <a:solidFill>
+                  <a:schemeClr val="tx1">
+                    <a:lumMod val="85000"/>
+                    <a:lumOff val="15000"/>
+                  </a:schemeClr>
+                </a:solidFill>
+              </a:rPr>
+              <a:t>BTC and ETH excluded</a:t>
+            </a:r>
           </a:p>
         </p:txBody>
       </p:sp>
@@ -12468,331 +13496,6 @@
     <p:extLst>
       <p:ext uri="{BB962C8B-B14F-4D97-AF65-F5344CB8AC3E}">
         <p14:creationId xmlns:p14="http://schemas.microsoft.com/office/powerpoint/2010/main" val="954477500"/>
-      </p:ext>
-    </p:extLst>
-  </p:cSld>
-  <p:clrMapOvr>
-    <a:masterClrMapping/>
-  </p:clrMapOvr>
-</p:sld>
-</file>
-
-<file path=ppt/slides/slide4.xml><?xml version="1.0" encoding="utf-8"?>
-<p:sld xmlns:a="http://schemas.openxmlformats.org/drawingml/2006/main" xmlns:r="http://schemas.openxmlformats.org/officeDocument/2006/relationships" xmlns:p="http://schemas.openxmlformats.org/presentationml/2006/main">
-  <p:cSld>
-    <p:bg>
-      <p:bgPr>
-        <a:solidFill>
-          <a:schemeClr val="bg1">
-            <a:lumMod val="95000"/>
-          </a:schemeClr>
-        </a:solidFill>
-        <a:effectLst/>
-      </p:bgPr>
-    </p:bg>
-    <p:spTree>
-      <p:nvGrpSpPr>
-        <p:cNvPr id="1" name=""/>
-        <p:cNvGrpSpPr/>
-        <p:nvPr/>
-      </p:nvGrpSpPr>
-      <p:grpSpPr>
-        <a:xfrm>
-          <a:off x="0" y="0"/>
-          <a:ext cx="0" cy="0"/>
-          <a:chOff x="0" y="0"/>
-          <a:chExt cx="0" cy="0"/>
-        </a:xfrm>
-      </p:grpSpPr>
-      <p:sp>
-        <p:nvSpPr>
-          <p:cNvPr id="2" name="Title 1">
-            <a:extLst>
-              <a:ext uri="{FF2B5EF4-FFF2-40B4-BE49-F238E27FC236}">
-                <a16:creationId xmlns:a16="http://schemas.microsoft.com/office/drawing/2014/main" id="{51F70220-677A-411B-B416-94321A555329}"/>
-              </a:ext>
-            </a:extLst>
-          </p:cNvPr>
-          <p:cNvSpPr>
-            <a:spLocks noGrp="1"/>
-          </p:cNvSpPr>
-          <p:nvPr>
-            <p:ph type="title"/>
-          </p:nvPr>
-        </p:nvSpPr>
-        <p:spPr>
-          <a:xfrm>
-            <a:off x="804672" y="964692"/>
-            <a:ext cx="4476806" cy="1188720"/>
-          </a:xfrm>
-        </p:spPr>
-        <p:txBody>
-          <a:bodyPr vert="horz" lIns="182880" tIns="182880" rIns="182880" bIns="182880" rtlCol="0">
-            <a:normAutofit/>
-          </a:bodyPr>
-          <a:lstStyle/>
-          <a:p>
-            <a:br>
-              <a:rPr lang="en-US" sz="2000"/>
-            </a:br>
-            <a:r>
-              <a:rPr lang="en-US" sz="2000"/>
-              <a:t>Overview</a:t>
-            </a:r>
-            <a:br>
-              <a:rPr lang="en-US" sz="2000"/>
-            </a:br>
-            <a:endParaRPr lang="en-US" sz="2000"/>
-          </a:p>
-        </p:txBody>
-      </p:sp>
-      <p:sp>
-        <p:nvSpPr>
-          <p:cNvPr id="3" name="Content Placeholder 2">
-            <a:extLst>
-              <a:ext uri="{FF2B5EF4-FFF2-40B4-BE49-F238E27FC236}">
-                <a16:creationId xmlns:a16="http://schemas.microsoft.com/office/drawing/2014/main" id="{667D1328-A694-4327-A93A-3D919FD65B27}"/>
-              </a:ext>
-            </a:extLst>
-          </p:cNvPr>
-          <p:cNvSpPr>
-            <a:spLocks noGrp="1"/>
-          </p:cNvSpPr>
-          <p:nvPr>
-            <p:ph idx="1"/>
-          </p:nvPr>
-        </p:nvSpPr>
-        <p:spPr>
-          <a:xfrm>
-            <a:off x="803244" y="2638044"/>
-            <a:ext cx="4492932" cy="3263206"/>
-          </a:xfrm>
-        </p:spPr>
-        <p:txBody>
-          <a:bodyPr>
-            <a:normAutofit/>
-          </a:bodyPr>
-          <a:lstStyle/>
-          <a:p>
-            <a:pPr marL="0" indent="0">
-              <a:buNone/>
-            </a:pPr>
-            <a:endParaRPr lang="en-US" dirty="0">
-              <a:latin typeface="-apple-system"/>
-            </a:endParaRPr>
-          </a:p>
-          <a:p>
-            <a:pPr marL="0" indent="0">
-              <a:buNone/>
-            </a:pPr>
-            <a:r>
-              <a:rPr lang="en-US" dirty="0">
-                <a:latin typeface="-apple-system"/>
-              </a:rPr>
-              <a:t>Observed &amp; analyzed BTC,ETH,ADA to see the  volatility over approximately the last 2 years to current day by applying algorithms and machine learning to assist in letting a crypto investor know to buy, sell, or hold on to their investments.</a:t>
-            </a:r>
-          </a:p>
-          <a:p>
-            <a:pPr marL="0" indent="0">
-              <a:buNone/>
-            </a:pPr>
-            <a:r>
-              <a:rPr lang="en-US" dirty="0">
-                <a:latin typeface="-apple-system"/>
-              </a:rPr>
-              <a:t>We applied $1000 as our base investment to see our profits and losses.</a:t>
-            </a:r>
-          </a:p>
-          <a:p>
-            <a:pPr marL="0" indent="0">
-              <a:buNone/>
-            </a:pPr>
-            <a:endParaRPr lang="en-US" dirty="0">
-              <a:latin typeface="-apple-system"/>
-            </a:endParaRPr>
-          </a:p>
-          <a:p>
-            <a:endParaRPr lang="en-US" dirty="0"/>
-          </a:p>
-        </p:txBody>
-      </p:sp>
-      <p:sp>
-        <p:nvSpPr>
-          <p:cNvPr id="3101" name="Rectangle 3100">
-            <a:extLst>
-              <a:ext uri="{FF2B5EF4-FFF2-40B4-BE49-F238E27FC236}">
-                <a16:creationId xmlns:a16="http://schemas.microsoft.com/office/drawing/2014/main" id="{56533F40-045E-4E3D-9243-864CD4E58669}"/>
-              </a:ext>
-              <a:ext uri="{C183D7F6-B498-43B3-948B-1728B52AA6E4}">
-                <adec:decorative xmlns:adec="http://schemas.microsoft.com/office/drawing/2017/decorative" val="1"/>
-              </a:ext>
-            </a:extLst>
-          </p:cNvPr>
-          <p:cNvSpPr>
-            <a:spLocks noGrp="1" noRot="1" noChangeAspect="1" noMove="1" noResize="1" noEditPoints="1" noAdjustHandles="1" noChangeArrowheads="1" noChangeShapeType="1" noTextEdit="1"/>
-          </p:cNvSpPr>
-          <p:nvPr>
-            <p:extLst>
-              <p:ext uri="{386F3935-93C4-4BCD-93E2-E3B085C9AB24}">
-                <p16:designElem xmlns:p16="http://schemas.microsoft.com/office/powerpoint/2015/main" val="1"/>
-              </p:ext>
-            </p:extLst>
-          </p:nvPr>
-        </p:nvSpPr>
-        <p:spPr>
-          <a:xfrm>
-            <a:off x="5943605" y="964692"/>
-            <a:ext cx="5440680" cy="4936558"/>
-          </a:xfrm>
-          <a:prstGeom prst="rect">
-            <a:avLst/>
-          </a:prstGeom>
-          <a:noFill/>
-          <a:ln w="31750" cap="sq">
-            <a:solidFill>
-              <a:srgbClr val="FFFFFF"/>
-            </a:solidFill>
-            <a:miter lim="800000"/>
-          </a:ln>
-        </p:spPr>
-        <p:style>
-          <a:lnRef idx="2">
-            <a:schemeClr val="accent1">
-              <a:shade val="50000"/>
-            </a:schemeClr>
-          </a:lnRef>
-          <a:fillRef idx="1">
-            <a:schemeClr val="accent1"/>
-          </a:fillRef>
-          <a:effectRef idx="0">
-            <a:schemeClr val="accent1"/>
-          </a:effectRef>
-          <a:fontRef idx="minor">
-            <a:schemeClr val="lt1"/>
-          </a:fontRef>
-        </p:style>
-        <p:txBody>
-          <a:bodyPr rtlCol="0" anchor="ctr"/>
-          <a:lstStyle/>
-          <a:p>
-            <a:pPr algn="ctr"/>
-            <a:endParaRPr lang="en-US" dirty="0"/>
-          </a:p>
-        </p:txBody>
-      </p:sp>
-      <p:sp>
-        <p:nvSpPr>
-          <p:cNvPr id="3103" name="Rectangle 3102">
-            <a:extLst>
-              <a:ext uri="{FF2B5EF4-FFF2-40B4-BE49-F238E27FC236}">
-                <a16:creationId xmlns:a16="http://schemas.microsoft.com/office/drawing/2014/main" id="{30402EC6-D845-41B3-BEBE-CB34D9BFEA60}"/>
-              </a:ext>
-              <a:ext uri="{C183D7F6-B498-43B3-948B-1728B52AA6E4}">
-                <adec:decorative xmlns:adec="http://schemas.microsoft.com/office/drawing/2017/decorative" val="1"/>
-              </a:ext>
-            </a:extLst>
-          </p:cNvPr>
-          <p:cNvSpPr>
-            <a:spLocks noGrp="1" noRot="1" noChangeAspect="1" noMove="1" noResize="1" noEditPoints="1" noAdjustHandles="1" noChangeArrowheads="1" noChangeShapeType="1" noTextEdit="1"/>
-          </p:cNvSpPr>
-          <p:nvPr>
-            <p:extLst>
-              <p:ext uri="{386F3935-93C4-4BCD-93E2-E3B085C9AB24}">
-                <p16:designElem xmlns:p16="http://schemas.microsoft.com/office/powerpoint/2015/main" val="1"/>
-              </p:ext>
-            </p:extLst>
-          </p:nvPr>
-        </p:nvSpPr>
-        <p:spPr>
-          <a:xfrm>
-            <a:off x="6110699" y="1128683"/>
-            <a:ext cx="5106493" cy="4608576"/>
-          </a:xfrm>
-          <a:prstGeom prst="rect">
-            <a:avLst/>
-          </a:prstGeom>
-          <a:solidFill>
-            <a:srgbClr val="FFFFFF"/>
-          </a:solidFill>
-          <a:ln>
-            <a:noFill/>
-          </a:ln>
-        </p:spPr>
-        <p:style>
-          <a:lnRef idx="2">
-            <a:schemeClr val="accent1">
-              <a:shade val="50000"/>
-            </a:schemeClr>
-          </a:lnRef>
-          <a:fillRef idx="1">
-            <a:schemeClr val="accent1"/>
-          </a:fillRef>
-          <a:effectRef idx="0">
-            <a:schemeClr val="accent1"/>
-          </a:effectRef>
-          <a:fontRef idx="minor">
-            <a:schemeClr val="lt1"/>
-          </a:fontRef>
-        </p:style>
-        <p:txBody>
-          <a:bodyPr rtlCol="0" anchor="ctr"/>
-          <a:lstStyle/>
-          <a:p>
-            <a:pPr algn="ctr"/>
-            <a:endParaRPr lang="en-US"/>
-          </a:p>
-        </p:txBody>
-      </p:sp>
-      <p:pic>
-        <p:nvPicPr>
-          <p:cNvPr id="3076" name="Picture 4" descr="The Russian fintech scene in the spotlight - Emerging Europe">
-            <a:extLst>
-              <a:ext uri="{FF2B5EF4-FFF2-40B4-BE49-F238E27FC236}">
-                <a16:creationId xmlns:a16="http://schemas.microsoft.com/office/drawing/2014/main" id="{45C8429F-2FB8-4396-0485-F7862CC7E946}"/>
-              </a:ext>
-            </a:extLst>
-          </p:cNvPr>
-          <p:cNvPicPr>
-            <a:picLocks noChangeAspect="1" noChangeArrowheads="1"/>
-          </p:cNvPicPr>
-          <p:nvPr/>
-        </p:nvPicPr>
-        <p:blipFill>
-          <a:blip r:embed="rId3">
-            <a:extLst>
-              <a:ext uri="{28A0092B-C50C-407E-A947-70E740481C1C}">
-                <a14:useLocalDpi xmlns:a14="http://schemas.microsoft.com/office/drawing/2010/main" val="0"/>
-              </a:ext>
-            </a:extLst>
-          </a:blip>
-          <a:stretch>
-            <a:fillRect/>
-          </a:stretch>
-        </p:blipFill>
-        <p:spPr bwMode="auto">
-          <a:xfrm>
-            <a:off x="6272789" y="2087946"/>
-            <a:ext cx="4782312" cy="2690050"/>
-          </a:xfrm>
-          <a:prstGeom prst="rect">
-            <a:avLst/>
-          </a:prstGeom>
-          <a:noFill/>
-          <a:extLst>
-            <a:ext uri="{909E8E84-426E-40DD-AFC4-6F175D3DCCD1}">
-              <a14:hiddenFill xmlns:a14="http://schemas.microsoft.com/office/drawing/2010/main">
-                <a:solidFill>
-                  <a:srgbClr val="FFFFFF"/>
-                </a:solidFill>
-              </a14:hiddenFill>
-            </a:ext>
-          </a:extLst>
-        </p:spPr>
-      </p:pic>
-    </p:spTree>
-    <p:extLst>
-      <p:ext uri="{BB962C8B-B14F-4D97-AF65-F5344CB8AC3E}">
-        <p14:creationId xmlns:p14="http://schemas.microsoft.com/office/powerpoint/2010/main" val="2673849116"/>
       </p:ext>
     </p:extLst>
   </p:cSld>
@@ -13586,7 +14289,7 @@
           <a:lstStyle/>
           <a:p>
             <a:r>
-              <a:rPr lang="en-US">
+              <a:rPr lang="en-US" dirty="0">
                 <a:solidFill>
                   <a:srgbClr val="FFFFFF"/>
                 </a:solidFill>
@@ -13596,8 +14299,16 @@
             </a:r>
           </a:p>
           <a:p>
+            <a:endParaRPr lang="en-US" dirty="0">
+              <a:solidFill>
+                <a:srgbClr val="FFFFFF"/>
+              </a:solidFill>
+              <a:latin typeface="-apple-system"/>
+            </a:endParaRPr>
+          </a:p>
+          <a:p>
             <a:r>
-              <a:rPr lang="en-US">
+              <a:rPr lang="en-US" dirty="0">
                 <a:solidFill>
                   <a:srgbClr val="FFFFFF"/>
                 </a:solidFill>
@@ -13607,21 +14318,29 @@
             </a:r>
           </a:p>
           <a:p>
+            <a:endParaRPr lang="en-US" dirty="0">
+              <a:solidFill>
+                <a:srgbClr val="FFFFFF"/>
+              </a:solidFill>
+              <a:latin typeface="-apple-system"/>
+            </a:endParaRPr>
+          </a:p>
+          <a:p>
             <a:r>
-              <a:rPr lang="en-US">
+              <a:rPr lang="en-US" dirty="0">
                 <a:solidFill>
                   <a:srgbClr val="FFFFFF"/>
                 </a:solidFill>
                 <a:latin typeface="-apple-system"/>
               </a:rPr>
-              <a:t>Will our algorithms show us which direction to go with our investments in order to increase profit and minimize losses?</a:t>
+              <a:t>Can you use a trading strategy to grow in a bear market?</a:t>
             </a:r>
           </a:p>
           <a:p>
             <a:pPr marL="0" indent="0">
               <a:buNone/>
             </a:pPr>
-            <a:endParaRPr lang="en-US">
+            <a:endParaRPr lang="en-US" dirty="0">
               <a:solidFill>
                 <a:srgbClr val="FFFFFF"/>
               </a:solidFill>
@@ -13629,7 +14348,7 @@
             </a:endParaRPr>
           </a:p>
           <a:p>
-            <a:endParaRPr lang="en-US">
+            <a:endParaRPr lang="en-US" dirty="0">
               <a:solidFill>
                 <a:srgbClr val="FFFFFF"/>
               </a:solidFill>
@@ -14384,327 +15103,6 @@
         </p:nvSpPr>
         <p:spPr>
           <a:xfrm>
-            <a:off x="8190983" y="3831477"/>
-            <a:ext cx="3363974" cy="1495794"/>
-          </a:xfrm>
-          <a:noFill/>
-          <a:ln>
-            <a:solidFill>
-              <a:srgbClr val="FFFFFF"/>
-            </a:solidFill>
-          </a:ln>
-          <a:effectLst>
-            <a:glow rad="152400">
-              <a:schemeClr val="bg1">
-                <a:alpha val="13000"/>
-              </a:schemeClr>
-            </a:glow>
-          </a:effectLst>
-        </p:spPr>
-        <p:txBody>
-          <a:bodyPr wrap="square">
-            <a:normAutofit/>
-          </a:bodyPr>
-          <a:lstStyle/>
-          <a:p>
-            <a:r>
-              <a:rPr lang="en-US" dirty="0">
-                <a:solidFill>
-                  <a:srgbClr val="FFFFFF"/>
-                </a:solidFill>
-              </a:rPr>
-              <a:t>Strategy visuals</a:t>
-            </a:r>
-            <a:br>
-              <a:rPr lang="en-US" dirty="0">
-                <a:solidFill>
-                  <a:srgbClr val="FFFFFF"/>
-                </a:solidFill>
-              </a:rPr>
-            </a:br>
-            <a:r>
-              <a:rPr lang="en-US" sz="1600" dirty="0">
-                <a:solidFill>
-                  <a:srgbClr val="FFFFFF"/>
-                </a:solidFill>
-              </a:rPr>
-              <a:t>**2 year window**</a:t>
-            </a:r>
-          </a:p>
-        </p:txBody>
-      </p:sp>
-      <p:pic>
-        <p:nvPicPr>
-          <p:cNvPr id="10" name="Picture 9" descr="Chart&#10;&#10;Description automatically generated">
-            <a:extLst>
-              <a:ext uri="{FF2B5EF4-FFF2-40B4-BE49-F238E27FC236}">
-                <a16:creationId xmlns:a16="http://schemas.microsoft.com/office/drawing/2014/main" id="{04F052E9-FF7D-BA2E-ED54-ADECCA8AABE4}"/>
-              </a:ext>
-            </a:extLst>
-          </p:cNvPr>
-          <p:cNvPicPr>
-            <a:picLocks noChangeAspect="1"/>
-          </p:cNvPicPr>
-          <p:nvPr/>
-        </p:nvPicPr>
-        <p:blipFill>
-          <a:blip r:embed="rId3"/>
-          <a:stretch>
-            <a:fillRect/>
-          </a:stretch>
-        </p:blipFill>
-        <p:spPr>
-          <a:xfrm>
-            <a:off x="7800321" y="294968"/>
-            <a:ext cx="3766515" cy="3052916"/>
-          </a:xfrm>
-          <a:prstGeom prst="rect">
-            <a:avLst/>
-          </a:prstGeom>
-        </p:spPr>
-      </p:pic>
-      <p:pic>
-        <p:nvPicPr>
-          <p:cNvPr id="9" name="Picture 8" descr="Graphical user interface, chart, histogram&#10;&#10;Description automatically generated">
-            <a:extLst>
-              <a:ext uri="{FF2B5EF4-FFF2-40B4-BE49-F238E27FC236}">
-                <a16:creationId xmlns:a16="http://schemas.microsoft.com/office/drawing/2014/main" id="{AA37DBF4-0478-A9A2-CE6B-D1B04ABCB444}"/>
-              </a:ext>
-            </a:extLst>
-          </p:cNvPr>
-          <p:cNvPicPr>
-            <a:picLocks noChangeAspect="1"/>
-          </p:cNvPicPr>
-          <p:nvPr/>
-        </p:nvPicPr>
-        <p:blipFill>
-          <a:blip r:embed="rId4"/>
-          <a:stretch>
-            <a:fillRect/>
-          </a:stretch>
-        </p:blipFill>
-        <p:spPr>
-          <a:xfrm>
-            <a:off x="646204" y="3347884"/>
-            <a:ext cx="6245296" cy="3393202"/>
-          </a:xfrm>
-          <a:prstGeom prst="rect">
-            <a:avLst/>
-          </a:prstGeom>
-        </p:spPr>
-      </p:pic>
-      <p:pic>
-        <p:nvPicPr>
-          <p:cNvPr id="12" name="Picture 11" descr="Chart, histogram&#10;&#10;Description automatically generated">
-            <a:extLst>
-              <a:ext uri="{FF2B5EF4-FFF2-40B4-BE49-F238E27FC236}">
-                <a16:creationId xmlns:a16="http://schemas.microsoft.com/office/drawing/2014/main" id="{F7C3151D-8C67-2C05-986B-43C62F6E9EFB}"/>
-              </a:ext>
-            </a:extLst>
-          </p:cNvPr>
-          <p:cNvPicPr>
-            <a:picLocks noChangeAspect="1"/>
-          </p:cNvPicPr>
-          <p:nvPr/>
-        </p:nvPicPr>
-        <p:blipFill>
-          <a:blip r:embed="rId5"/>
-          <a:stretch>
-            <a:fillRect/>
-          </a:stretch>
-        </p:blipFill>
-        <p:spPr>
-          <a:xfrm>
-            <a:off x="646203" y="221226"/>
-            <a:ext cx="6266338" cy="3126658"/>
-          </a:xfrm>
-          <a:prstGeom prst="rect">
-            <a:avLst/>
-          </a:prstGeom>
-        </p:spPr>
-      </p:pic>
-    </p:spTree>
-    <p:extLst>
-      <p:ext uri="{BB962C8B-B14F-4D97-AF65-F5344CB8AC3E}">
-        <p14:creationId xmlns:p14="http://schemas.microsoft.com/office/powerpoint/2010/main" val="4128952323"/>
-      </p:ext>
-    </p:extLst>
-  </p:cSld>
-  <p:clrMapOvr>
-    <a:masterClrMapping/>
-  </p:clrMapOvr>
-</p:sld>
-</file>
-
-<file path=ppt/slides/slide9.xml><?xml version="1.0" encoding="utf-8"?>
-<p:sld xmlns:a="http://schemas.openxmlformats.org/drawingml/2006/main" xmlns:r="http://schemas.openxmlformats.org/officeDocument/2006/relationships" xmlns:p="http://schemas.openxmlformats.org/presentationml/2006/main">
-  <p:cSld>
-    <p:bg>
-      <p:bgPr>
-        <a:solidFill>
-          <a:schemeClr val="bg1"/>
-        </a:solidFill>
-        <a:effectLst/>
-      </p:bgPr>
-    </p:bg>
-    <p:spTree>
-      <p:nvGrpSpPr>
-        <p:cNvPr id="1" name=""/>
-        <p:cNvGrpSpPr/>
-        <p:nvPr/>
-      </p:nvGrpSpPr>
-      <p:grpSpPr>
-        <a:xfrm>
-          <a:off x="0" y="0"/>
-          <a:ext cx="0" cy="0"/>
-          <a:chOff x="0" y="0"/>
-          <a:chExt cx="0" cy="0"/>
-        </a:xfrm>
-      </p:grpSpPr>
-      <p:sp useBgFill="1">
-        <p:nvSpPr>
-          <p:cNvPr id="18" name="Rectangle 17">
-            <a:extLst>
-              <a:ext uri="{FF2B5EF4-FFF2-40B4-BE49-F238E27FC236}">
-                <a16:creationId xmlns:a16="http://schemas.microsoft.com/office/drawing/2014/main" id="{0AF33C27-9C85-4B30-9AD7-879D48AFE4FF}"/>
-              </a:ext>
-              <a:ext uri="{C183D7F6-B498-43B3-948B-1728B52AA6E4}">
-                <adec:decorative xmlns:adec="http://schemas.microsoft.com/office/drawing/2017/decorative" val="1"/>
-              </a:ext>
-            </a:extLst>
-          </p:cNvPr>
-          <p:cNvSpPr>
-            <a:spLocks noGrp="1" noRot="1" noChangeAspect="1" noMove="1" noResize="1" noEditPoints="1" noAdjustHandles="1" noChangeArrowheads="1" noChangeShapeType="1" noTextEdit="1"/>
-          </p:cNvSpPr>
-          <p:nvPr>
-            <p:extLst>
-              <p:ext uri="{386F3935-93C4-4BCD-93E2-E3B085C9AB24}">
-                <p16:designElem xmlns:p16="http://schemas.microsoft.com/office/powerpoint/2015/main" val="1"/>
-              </p:ext>
-            </p:extLst>
-          </p:nvPr>
-        </p:nvSpPr>
-        <p:spPr>
-          <a:xfrm>
-            <a:off x="0" y="0"/>
-            <a:ext cx="12191999" cy="6858000"/>
-          </a:xfrm>
-          <a:prstGeom prst="rect">
-            <a:avLst/>
-          </a:prstGeom>
-          <a:ln>
-            <a:noFill/>
-          </a:ln>
-        </p:spPr>
-        <p:style>
-          <a:lnRef idx="2">
-            <a:schemeClr val="accent1">
-              <a:shade val="50000"/>
-            </a:schemeClr>
-          </a:lnRef>
-          <a:fillRef idx="1">
-            <a:schemeClr val="accent1"/>
-          </a:fillRef>
-          <a:effectRef idx="0">
-            <a:schemeClr val="accent1"/>
-          </a:effectRef>
-          <a:fontRef idx="minor">
-            <a:schemeClr val="lt1"/>
-          </a:fontRef>
-        </p:style>
-        <p:txBody>
-          <a:bodyPr rtlCol="0" anchor="ctr"/>
-          <a:lstStyle/>
-          <a:p>
-            <a:pPr algn="ctr"/>
-            <a:endParaRPr lang="en-US" dirty="0"/>
-          </a:p>
-        </p:txBody>
-      </p:sp>
-      <p:sp>
-        <p:nvSpPr>
-          <p:cNvPr id="20" name="Rectangle 19">
-            <a:extLst>
-              <a:ext uri="{FF2B5EF4-FFF2-40B4-BE49-F238E27FC236}">
-                <a16:creationId xmlns:a16="http://schemas.microsoft.com/office/drawing/2014/main" id="{6D5089DD-882D-4413-B8BF-4798BFD84A98}"/>
-              </a:ext>
-              <a:ext uri="{C183D7F6-B498-43B3-948B-1728B52AA6E4}">
-                <adec:decorative xmlns:adec="http://schemas.microsoft.com/office/drawing/2017/decorative" val="1"/>
-              </a:ext>
-            </a:extLst>
-          </p:cNvPr>
-          <p:cNvSpPr>
-            <a:spLocks noGrp="1" noRot="1" noChangeAspect="1" noMove="1" noResize="1" noEditPoints="1" noAdjustHandles="1" noChangeArrowheads="1" noChangeShapeType="1" noTextEdit="1"/>
-          </p:cNvSpPr>
-          <p:nvPr>
-            <p:extLst>
-              <p:ext uri="{386F3935-93C4-4BCD-93E2-E3B085C9AB24}">
-                <p16:designElem xmlns:p16="http://schemas.microsoft.com/office/powerpoint/2015/main" val="1"/>
-              </p:ext>
-            </p:extLst>
-          </p:nvPr>
-        </p:nvSpPr>
-        <p:spPr>
-          <a:xfrm>
-            <a:off x="7537704" y="0"/>
-            <a:ext cx="4654296" cy="6858000"/>
-          </a:xfrm>
-          <a:prstGeom prst="rect">
-            <a:avLst/>
-          </a:prstGeom>
-          <a:solidFill>
-            <a:schemeClr val="tx1">
-              <a:lumMod val="95000"/>
-              <a:lumOff val="5000"/>
-            </a:schemeClr>
-          </a:solidFill>
-          <a:ln>
-            <a:noFill/>
-          </a:ln>
-        </p:spPr>
-        <p:style>
-          <a:lnRef idx="2">
-            <a:schemeClr val="accent1">
-              <a:shade val="50000"/>
-            </a:schemeClr>
-          </a:lnRef>
-          <a:fillRef idx="1">
-            <a:schemeClr val="accent1"/>
-          </a:fillRef>
-          <a:effectRef idx="0">
-            <a:schemeClr val="accent1"/>
-          </a:effectRef>
-          <a:fontRef idx="minor">
-            <a:schemeClr val="lt1"/>
-          </a:fontRef>
-        </p:style>
-        <p:txBody>
-          <a:bodyPr rtlCol="0" anchor="ctr"/>
-          <a:lstStyle/>
-          <a:p>
-            <a:pPr algn="ctr"/>
-            <a:endParaRPr lang="en-US" dirty="0"/>
-          </a:p>
-        </p:txBody>
-      </p:sp>
-      <p:sp>
-        <p:nvSpPr>
-          <p:cNvPr id="2" name="Title 1">
-            <a:extLst>
-              <a:ext uri="{FF2B5EF4-FFF2-40B4-BE49-F238E27FC236}">
-                <a16:creationId xmlns:a16="http://schemas.microsoft.com/office/drawing/2014/main" id="{8EB78894-19E5-4916-B37E-B4A80B9B8D52}"/>
-              </a:ext>
-            </a:extLst>
-          </p:cNvPr>
-          <p:cNvSpPr>
-            <a:spLocks noGrp="1"/>
-          </p:cNvSpPr>
-          <p:nvPr>
-            <p:ph type="title"/>
-          </p:nvPr>
-        </p:nvSpPr>
-        <p:spPr>
-          <a:xfrm>
             <a:off x="8338466" y="2489373"/>
             <a:ext cx="3363974" cy="1495794"/>
           </a:xfrm>
@@ -14818,6 +15216,66 @@
     <p:extLst>
       <p:ext uri="{BB962C8B-B14F-4D97-AF65-F5344CB8AC3E}">
         <p14:creationId xmlns:p14="http://schemas.microsoft.com/office/powerpoint/2010/main" val="3448316882"/>
+      </p:ext>
+    </p:extLst>
+  </p:cSld>
+  <p:clrMapOvr>
+    <a:masterClrMapping/>
+  </p:clrMapOvr>
+</p:sld>
+</file>
+
+<file path=ppt/slides/slide9.xml><?xml version="1.0" encoding="utf-8"?>
+<p:sld xmlns:a="http://schemas.openxmlformats.org/drawingml/2006/main" xmlns:r="http://schemas.openxmlformats.org/officeDocument/2006/relationships" xmlns:p="http://schemas.openxmlformats.org/presentationml/2006/main">
+  <p:cSld>
+    <p:spTree>
+      <p:nvGrpSpPr>
+        <p:cNvPr id="1" name=""/>
+        <p:cNvGrpSpPr/>
+        <p:nvPr/>
+      </p:nvGrpSpPr>
+      <p:grpSpPr>
+        <a:xfrm>
+          <a:off x="0" y="0"/>
+          <a:ext cx="0" cy="0"/>
+          <a:chOff x="0" y="0"/>
+          <a:chExt cx="0" cy="0"/>
+        </a:xfrm>
+      </p:grpSpPr>
+      <p:pic>
+        <p:nvPicPr>
+          <p:cNvPr id="3" name="Picture 2" descr="Chart&#10;&#10;Description automatically generated">
+            <a:extLst>
+              <a:ext uri="{FF2B5EF4-FFF2-40B4-BE49-F238E27FC236}">
+                <a16:creationId xmlns:a16="http://schemas.microsoft.com/office/drawing/2014/main" id="{1177427C-6C3F-4B0D-2D9A-62F0CF9E4CF4}"/>
+              </a:ext>
+            </a:extLst>
+          </p:cNvPr>
+          <p:cNvPicPr>
+            <a:picLocks noChangeAspect="1"/>
+          </p:cNvPicPr>
+          <p:nvPr/>
+        </p:nvPicPr>
+        <p:blipFill>
+          <a:blip r:embed="rId3"/>
+          <a:stretch>
+            <a:fillRect/>
+          </a:stretch>
+        </p:blipFill>
+        <p:spPr>
+          <a:xfrm>
+            <a:off x="381000" y="0"/>
+            <a:ext cx="11430000" cy="6858000"/>
+          </a:xfrm>
+          <a:prstGeom prst="rect">
+            <a:avLst/>
+          </a:prstGeom>
+        </p:spPr>
+      </p:pic>
+    </p:spTree>
+    <p:extLst>
+      <p:ext uri="{BB962C8B-B14F-4D97-AF65-F5344CB8AC3E}">
+        <p14:creationId xmlns:p14="http://schemas.microsoft.com/office/powerpoint/2010/main" val="2125690892"/>
       </p:ext>
     </p:extLst>
   </p:cSld>

</xml_diff>